<commit_message>
Lots of small code changes.
</commit_message>
<xml_diff>
--- a/Documentation/MESSAGE PROTOCOL.pptx
+++ b/Documentation/MESSAGE PROTOCOL.pptx
@@ -291,7 +291,7 @@
             <a:fld id="{C9AF0019-28A8-49AD-ABAF-5815E24A3DDC}" type="datetimeFigureOut">
               <a:rPr lang="en-US" smtClean="0"/>
               <a:pPr/>
-              <a:t>2/26/2015</a:t>
+              <a:t>4/8/2015</a:t>
             </a:fld>
             <a:endParaRPr lang="en-US"/>
           </a:p>
@@ -458,7 +458,7 @@
             <a:fld id="{C9AF0019-28A8-49AD-ABAF-5815E24A3DDC}" type="datetimeFigureOut">
               <a:rPr lang="en-US" smtClean="0"/>
               <a:pPr/>
-              <a:t>2/26/2015</a:t>
+              <a:t>4/8/2015</a:t>
             </a:fld>
             <a:endParaRPr lang="en-US"/>
           </a:p>
@@ -635,7 +635,7 @@
             <a:fld id="{C9AF0019-28A8-49AD-ABAF-5815E24A3DDC}" type="datetimeFigureOut">
               <a:rPr lang="en-US" smtClean="0"/>
               <a:pPr/>
-              <a:t>2/26/2015</a:t>
+              <a:t>4/8/2015</a:t>
             </a:fld>
             <a:endParaRPr lang="en-US"/>
           </a:p>
@@ -802,7 +802,7 @@
             <a:fld id="{C9AF0019-28A8-49AD-ABAF-5815E24A3DDC}" type="datetimeFigureOut">
               <a:rPr lang="en-US" smtClean="0"/>
               <a:pPr/>
-              <a:t>2/26/2015</a:t>
+              <a:t>4/8/2015</a:t>
             </a:fld>
             <a:endParaRPr lang="en-US"/>
           </a:p>
@@ -1045,7 +1045,7 @@
             <a:fld id="{C9AF0019-28A8-49AD-ABAF-5815E24A3DDC}" type="datetimeFigureOut">
               <a:rPr lang="en-US" smtClean="0"/>
               <a:pPr/>
-              <a:t>2/26/2015</a:t>
+              <a:t>4/8/2015</a:t>
             </a:fld>
             <a:endParaRPr lang="en-US"/>
           </a:p>
@@ -1330,7 +1330,7 @@
             <a:fld id="{C9AF0019-28A8-49AD-ABAF-5815E24A3DDC}" type="datetimeFigureOut">
               <a:rPr lang="en-US" smtClean="0"/>
               <a:pPr/>
-              <a:t>2/26/2015</a:t>
+              <a:t>4/8/2015</a:t>
             </a:fld>
             <a:endParaRPr lang="en-US"/>
           </a:p>
@@ -1749,7 +1749,7 @@
             <a:fld id="{C9AF0019-28A8-49AD-ABAF-5815E24A3DDC}" type="datetimeFigureOut">
               <a:rPr lang="en-US" smtClean="0"/>
               <a:pPr/>
-              <a:t>2/26/2015</a:t>
+              <a:t>4/8/2015</a:t>
             </a:fld>
             <a:endParaRPr lang="en-US"/>
           </a:p>
@@ -1864,7 +1864,7 @@
             <a:fld id="{C9AF0019-28A8-49AD-ABAF-5815E24A3DDC}" type="datetimeFigureOut">
               <a:rPr lang="en-US" smtClean="0"/>
               <a:pPr/>
-              <a:t>2/26/2015</a:t>
+              <a:t>4/8/2015</a:t>
             </a:fld>
             <a:endParaRPr lang="en-US"/>
           </a:p>
@@ -1956,7 +1956,7 @@
             <a:fld id="{C9AF0019-28A8-49AD-ABAF-5815E24A3DDC}" type="datetimeFigureOut">
               <a:rPr lang="en-US" smtClean="0"/>
               <a:pPr/>
-              <a:t>2/26/2015</a:t>
+              <a:t>4/8/2015</a:t>
             </a:fld>
             <a:endParaRPr lang="en-US"/>
           </a:p>
@@ -2230,7 +2230,7 @@
             <a:fld id="{C9AF0019-28A8-49AD-ABAF-5815E24A3DDC}" type="datetimeFigureOut">
               <a:rPr lang="en-US" smtClean="0"/>
               <a:pPr/>
-              <a:t>2/26/2015</a:t>
+              <a:t>4/8/2015</a:t>
             </a:fld>
             <a:endParaRPr lang="en-US"/>
           </a:p>
@@ -2480,7 +2480,7 @@
             <a:fld id="{C9AF0019-28A8-49AD-ABAF-5815E24A3DDC}" type="datetimeFigureOut">
               <a:rPr lang="en-US" smtClean="0"/>
               <a:pPr/>
-              <a:t>2/26/2015</a:t>
+              <a:t>4/8/2015</a:t>
             </a:fld>
             <a:endParaRPr lang="en-US"/>
           </a:p>
@@ -2690,7 +2690,7 @@
             <a:fld id="{C9AF0019-28A8-49AD-ABAF-5815E24A3DDC}" type="datetimeFigureOut">
               <a:rPr lang="en-US" smtClean="0"/>
               <a:pPr/>
-              <a:t>2/26/2015</a:t>
+              <a:t>4/8/2015</a:t>
             </a:fld>
             <a:endParaRPr lang="en-US"/>
           </a:p>
@@ -4424,7 +4424,7 @@
               <a:pPr>
                 <a:defRPr/>
               </a:pPr>
-              <a:t>2/26/2015</a:t>
+              <a:t>4/8/2015</a:t>
             </a:fld>
             <a:endParaRPr lang="en-US" dirty="0"/>
           </a:p>
@@ -4577,7 +4577,7 @@
         </p:spPr>
         <p:txBody>
           <a:bodyPr>
-            <a:normAutofit fontScale="92500" lnSpcReduction="20000"/>
+            <a:normAutofit fontScale="85000" lnSpcReduction="20000"/>
           </a:bodyPr>
           <a:lstStyle/>
           <a:p>
@@ -4644,11 +4644,7 @@
             <a:pPr lvl="1"/>
             <a:r>
               <a:rPr lang="en-US" sz="1600" dirty="0" smtClean="0"/>
-              <a:t>Sent from server to tablet when a round </a:t>
-            </a:r>
-            <a:r>
-              <a:rPr lang="en-US" sz="1600" dirty="0" smtClean="0"/>
-              <a:t>fired</a:t>
+              <a:t>Sent from server to tablet when a round fired</a:t>
             </a:r>
           </a:p>
           <a:p>
@@ -4674,11 +4670,24 @@
             <a:pPr lvl="1"/>
             <a:r>
               <a:rPr lang="en-US" sz="1600" dirty="0" smtClean="0"/>
-              <a:t>Indicates to Server to fire from current tube. ID of round included for </a:t>
-            </a:r>
-            <a:r>
-              <a:rPr lang="en-US" sz="1600" smtClean="0"/>
-              <a:t>verification purposes</a:t>
+              <a:t>Indicates to Server to fire from current tube. ID of round included for verification </a:t>
+            </a:r>
+            <a:r>
+              <a:rPr lang="en-US" sz="1600" dirty="0" smtClean="0"/>
+              <a:t>purposes</a:t>
+            </a:r>
+          </a:p>
+          <a:p>
+            <a:r>
+              <a:rPr lang="en-US" sz="2000" dirty="0" smtClean="0"/>
+              <a:t>Type 5: Pre-ex Population (MT+MAGINDEX+ID+FUZE+DEST+ELEV</a:t>
+            </a:r>
+          </a:p>
+          <a:p>
+            <a:pPr lvl="1"/>
+            <a:r>
+              <a:rPr lang="en-US" sz="1600" dirty="0" smtClean="0"/>
+              <a:t>Indicates to tablet that a round already exists, where the round is, and all related data</a:t>
             </a:r>
             <a:endParaRPr lang="en-US" sz="1600" dirty="0" smtClean="0"/>
           </a:p>

</xml_diff>